<commit_message>
retrained Inception V3 model with 10 epochs
</commit_message>
<xml_diff>
--- a/reports/project_reports.pptx
+++ b/reports/project_reports.pptx
@@ -18,9 +18,10 @@
     <p:sldId id="294" r:id="rId12"/>
     <p:sldId id="291" r:id="rId13"/>
     <p:sldId id="292" r:id="rId14"/>
-    <p:sldId id="293" r:id="rId15"/>
-    <p:sldId id="295" r:id="rId16"/>
-    <p:sldId id="296" r:id="rId17"/>
+    <p:sldId id="297" r:id="rId15"/>
+    <p:sldId id="293" r:id="rId16"/>
+    <p:sldId id="295" r:id="rId17"/>
+    <p:sldId id="296" r:id="rId18"/>
   </p:sldIdLst>
   <p:sldSz cx="12192000" cy="6858000"/>
   <p:notesSz cx="6858000" cy="9144000"/>
@@ -119,6 +120,11 @@
       </a:defRPr>
     </a:lvl9pPr>
   </p:defaultTextStyle>
+  <p:extLst>
+    <p:ext uri="{EFAFB233-063F-42B5-8137-9DF3F51BA10A}">
+      <p15:sldGuideLst xmlns:p15="http://schemas.microsoft.com/office/powerpoint/2012/main"/>
+    </p:ext>
+  </p:extLst>
 </p:presentation>
 </file>
 
@@ -13311,12 +13317,12 @@
         <a:lstStyle/>
         <a:p>
           <a:r>
-            <a:rPr lang="en-GB" b="1"/>
+            <a:rPr lang="en-GB" b="1" dirty="0"/>
             <a:t>Test Accuracy:</a:t>
           </a:r>
           <a:r>
-            <a:rPr lang="en-GB"/>
-            <a:t> 55.72%</a:t>
+            <a:rPr lang="en-GB" dirty="0"/>
+            <a:t> 64.41%</a:t>
           </a:r>
         </a:p>
       </dgm:t>
@@ -13356,7 +13362,7 @@
           </a:r>
           <a:r>
             <a:rPr lang="en-GB" dirty="0"/>
-            <a:t> 1.3712</a:t>
+            <a:t> 1.2282</a:t>
           </a:r>
         </a:p>
       </dgm:t>
@@ -16432,12 +16438,12 @@
             <a:buChar char="•"/>
           </a:pPr>
           <a:r>
-            <a:rPr lang="en-GB" sz="2400" b="1" kern="1200"/>
+            <a:rPr lang="en-GB" sz="2400" b="1" kern="1200" dirty="0"/>
             <a:t>Test Accuracy:</a:t>
           </a:r>
           <a:r>
-            <a:rPr lang="en-GB" sz="2400" kern="1200"/>
-            <a:t> 55.72%</a:t>
+            <a:rPr lang="en-GB" sz="2400" kern="1200" dirty="0"/>
+            <a:t> 64.41%</a:t>
           </a:r>
         </a:p>
         <a:p>
@@ -16459,7 +16465,7 @@
           </a:r>
           <a:r>
             <a:rPr lang="en-GB" sz="2400" kern="1200" dirty="0"/>
-            <a:t> 1.3712</a:t>
+            <a:t> 1.2282</a:t>
           </a:r>
         </a:p>
         <a:p>
@@ -41381,7 +41387,7 @@
             <p:ph idx="1"/>
             <p:extLst>
               <p:ext uri="{D42A27DB-BD31-4B8C-83A1-F6EECF244321}">
-                <p14:modId xmlns:p14="http://schemas.microsoft.com/office/powerpoint/2010/main" val="77362434"/>
+                <p14:modId xmlns:p14="http://schemas.microsoft.com/office/powerpoint/2010/main" val="3946514964"/>
               </p:ext>
             </p:extLst>
           </p:nvPr>
@@ -41434,12 +41440,12 @@
           <a:chExt cx="0" cy="0"/>
         </a:xfrm>
       </p:grpSpPr>
-      <p:sp useBgFill="1">
+      <p:sp>
         <p:nvSpPr>
-          <p:cNvPr id="8" name="Rectangle 7">
+          <p:cNvPr id="19" name="Rectangle 18">
             <a:extLst>
               <a:ext uri="{FF2B5EF4-FFF2-40B4-BE49-F238E27FC236}">
-                <a16:creationId xmlns:a16="http://schemas.microsoft.com/office/drawing/2014/main" id="{AB8C311F-7253-4AED-9701-7FC0708C41C7}"/>
+                <a16:creationId xmlns:a16="http://schemas.microsoft.com/office/drawing/2014/main" id="{32BC26D8-82FB-445E-AA49-62A77D7C1EE0}"/>
               </a:ext>
               <a:ext uri="{C183D7F6-B498-43B3-948B-1728B52AA6E4}">
                 <adec:decorative xmlns:adec="http://schemas.microsoft.com/office/drawing/2017/decorative" val="1"/>
@@ -41465,95 +41471,12 @@
           <a:prstGeom prst="rect">
             <a:avLst/>
           </a:prstGeom>
-          <a:ln w="12700" cap="flat" cmpd="sng" algn="ctr">
-            <a:noFill/>
-            <a:prstDash val="solid"/>
-            <a:miter lim="800000"/>
-          </a:ln>
-          <a:effectLst/>
-          <a:extLst>
-            <a:ext uri="{91240B29-F687-4F45-9708-019B960494DF}">
-              <a14:hiddenLine xmlns:a14="http://schemas.microsoft.com/office/drawing/2010/main" w="12700" cap="flat" cmpd="sng" algn="ctr">
-                <a:solidFill>
-                  <a:schemeClr val="accent1">
-                    <a:shade val="50000"/>
-                  </a:schemeClr>
-                </a:solidFill>
-                <a:prstDash val="solid"/>
-                <a:miter lim="800000"/>
-              </a14:hiddenLine>
-            </a:ext>
-          </a:extLst>
-        </p:spPr>
-        <p:style>
-          <a:lnRef idx="2">
-            <a:schemeClr val="accent1">
-              <a:shade val="50000"/>
+          <a:solidFill>
+            <a:schemeClr val="tx1">
+              <a:lumMod val="65000"/>
+              <a:lumOff val="35000"/>
             </a:schemeClr>
-          </a:lnRef>
-          <a:fillRef idx="1">
-            <a:schemeClr val="accent1"/>
-          </a:fillRef>
-          <a:effectRef idx="0">
-            <a:schemeClr val="accent1"/>
-          </a:effectRef>
-          <a:fontRef idx="minor">
-            <a:schemeClr val="lt1"/>
-          </a:fontRef>
-        </p:style>
-        <p:txBody>
-          <a:bodyPr rtlCol="0" anchor="ctr"/>
-          <a:lstStyle/>
-          <a:p>
-            <a:pPr algn="ctr"/>
-            <a:endParaRPr lang="en-US"/>
-          </a:p>
-        </p:txBody>
-      </p:sp>
-      <p:sp>
-        <p:nvSpPr>
-          <p:cNvPr id="10" name="Rectangle 9">
-            <a:extLst>
-              <a:ext uri="{FF2B5EF4-FFF2-40B4-BE49-F238E27FC236}">
-                <a16:creationId xmlns:a16="http://schemas.microsoft.com/office/drawing/2014/main" id="{E2384209-CB15-4CDF-9D31-C44FD9A3F20D}"/>
-              </a:ext>
-              <a:ext uri="{C183D7F6-B498-43B3-948B-1728B52AA6E4}">
-                <adec:decorative xmlns:adec="http://schemas.microsoft.com/office/drawing/2017/decorative" val="1"/>
-              </a:ext>
-            </a:extLst>
-          </p:cNvPr>
-          <p:cNvSpPr>
-            <a:spLocks noGrp="1" noRot="1" noChangeAspect="1" noMove="1" noResize="1" noEditPoints="1" noAdjustHandles="1" noChangeArrowheads="1" noChangeShapeType="1" noTextEdit="1"/>
-          </p:cNvSpPr>
-          <p:nvPr>
-            <p:extLst>
-              <p:ext uri="{386F3935-93C4-4BCD-93E2-E3B085C9AB24}">
-                <p16:designElem xmlns:p16="http://schemas.microsoft.com/office/powerpoint/2015/main" val="1"/>
-              </p:ext>
-            </p:extLst>
-          </p:nvPr>
-        </p:nvSpPr>
-        <p:spPr>
-          <a:xfrm rot="16200000" flipH="1">
-            <a:off x="2666617" y="-2666188"/>
-            <a:ext cx="6858000" cy="12191233"/>
-          </a:xfrm>
-          <a:prstGeom prst="rect">
-            <a:avLst/>
-          </a:prstGeom>
-          <a:gradFill>
-            <a:gsLst>
-              <a:gs pos="8000">
-                <a:schemeClr val="accent1"/>
-              </a:gs>
-              <a:gs pos="100000">
-                <a:schemeClr val="accent1">
-                  <a:lumMod val="50000"/>
-                </a:schemeClr>
-              </a:gs>
-            </a:gsLst>
-            <a:lin ang="12000000" scaled="0"/>
-          </a:gradFill>
+          </a:solidFill>
           <a:ln>
             <a:noFill/>
           </a:ln>
@@ -41585,10 +41508,10 @@
       </p:sp>
       <p:sp>
         <p:nvSpPr>
-          <p:cNvPr id="12" name="Rectangle 11">
+          <p:cNvPr id="21" name="Rectangle 20">
             <a:extLst>
               <a:ext uri="{FF2B5EF4-FFF2-40B4-BE49-F238E27FC236}">
-                <a16:creationId xmlns:a16="http://schemas.microsoft.com/office/drawing/2014/main" id="{2633B3B5-CC90-43F0-8714-D31D1F3F0209}"/>
+                <a16:creationId xmlns:a16="http://schemas.microsoft.com/office/drawing/2014/main" id="{CB44330D-EA18-4254-AA95-EB49948539B8}"/>
               </a:ext>
               <a:ext uri="{C183D7F6-B498-43B3-948B-1728B52AA6E4}">
                 <adec:decorative xmlns:adec="http://schemas.microsoft.com/office/drawing/2017/decorative" val="1"/>
@@ -41607,103 +41530,16 @@
           </p:nvPr>
         </p:nvSpPr>
         <p:spPr>
-          <a:xfrm rot="10800000" flipH="1">
-            <a:off x="-2311" y="0"/>
-            <a:ext cx="9070846" cy="6857572"/>
+          <a:xfrm>
+            <a:off x="477012" y="480060"/>
+            <a:ext cx="11237976" cy="5897880"/>
           </a:xfrm>
           <a:prstGeom prst="rect">
             <a:avLst/>
           </a:prstGeom>
-          <a:gradFill>
-            <a:gsLst>
-              <a:gs pos="8000">
-                <a:srgbClr val="000000">
-                  <a:alpha val="52000"/>
-                </a:srgbClr>
-              </a:gs>
-              <a:gs pos="100000">
-                <a:schemeClr val="accent1"/>
-              </a:gs>
-            </a:gsLst>
-            <a:lin ang="4800000" scaled="0"/>
-          </a:gradFill>
-          <a:ln>
-            <a:noFill/>
-          </a:ln>
-        </p:spPr>
-        <p:style>
-          <a:lnRef idx="2">
-            <a:schemeClr val="accent1">
-              <a:shade val="50000"/>
-            </a:schemeClr>
-          </a:lnRef>
-          <a:fillRef idx="1">
-            <a:schemeClr val="accent1"/>
-          </a:fillRef>
-          <a:effectRef idx="0">
-            <a:schemeClr val="accent1"/>
-          </a:effectRef>
-          <a:fontRef idx="minor">
-            <a:schemeClr val="lt1"/>
-          </a:fontRef>
-        </p:style>
-        <p:txBody>
-          <a:bodyPr rtlCol="0" anchor="ctr"/>
-          <a:lstStyle/>
-          <a:p>
-            <a:pPr algn="ctr"/>
-            <a:endParaRPr lang="en-US"/>
-          </a:p>
-        </p:txBody>
-      </p:sp>
-      <p:sp>
-        <p:nvSpPr>
-          <p:cNvPr id="14" name="Rectangle 13">
-            <a:extLst>
-              <a:ext uri="{FF2B5EF4-FFF2-40B4-BE49-F238E27FC236}">
-                <a16:creationId xmlns:a16="http://schemas.microsoft.com/office/drawing/2014/main" id="{A8D57A06-A426-446D-B02C-A2DC6B62E45E}"/>
-              </a:ext>
-              <a:ext uri="{C183D7F6-B498-43B3-948B-1728B52AA6E4}">
-                <adec:decorative xmlns:adec="http://schemas.microsoft.com/office/drawing/2017/decorative" val="1"/>
-              </a:ext>
-            </a:extLst>
-          </p:cNvPr>
-          <p:cNvSpPr>
-            <a:spLocks noGrp="1" noRot="1" noChangeAspect="1" noMove="1" noResize="1" noEditPoints="1" noAdjustHandles="1" noChangeArrowheads="1" noChangeShapeType="1" noTextEdit="1"/>
-          </p:cNvSpPr>
-          <p:nvPr>
-            <p:extLst>
-              <p:ext uri="{386F3935-93C4-4BCD-93E2-E3B085C9AB24}">
-                <p16:designElem xmlns:p16="http://schemas.microsoft.com/office/powerpoint/2015/main" val="1"/>
-              </p:ext>
-            </p:extLst>
-          </p:nvPr>
-        </p:nvSpPr>
-        <p:spPr>
-          <a:xfrm rot="16200000" flipH="1">
-            <a:off x="3649491" y="-1685840"/>
-            <a:ext cx="4894564" cy="12193546"/>
-          </a:xfrm>
-          <a:prstGeom prst="rect">
-            <a:avLst/>
-          </a:prstGeom>
-          <a:gradFill>
-            <a:gsLst>
-              <a:gs pos="0">
-                <a:schemeClr val="accent5">
-                  <a:lumMod val="60000"/>
-                  <a:lumOff val="40000"/>
-                  <a:alpha val="0"/>
-                </a:schemeClr>
-              </a:gs>
-              <a:gs pos="100000">
-                <a:srgbClr val="000000">
-                  <a:alpha val="46000"/>
-                </a:srgbClr>
-              </a:gs>
-            </a:gsLst>
-            <a:lin ang="1200000" scaled="0"/>
-          </a:gradFill>
+          <a:solidFill>
+            <a:srgbClr val="FFFFFF"/>
+          </a:solidFill>
           <a:ln>
             <a:noFill/>
           </a:ln>
@@ -41735,10 +41571,10 @@
       </p:sp>
       <p:pic>
         <p:nvPicPr>
-          <p:cNvPr id="3" name="Picture 2">
+          <p:cNvPr id="4" name="Picture 3">
             <a:extLst>
               <a:ext uri="{FF2B5EF4-FFF2-40B4-BE49-F238E27FC236}">
-                <a16:creationId xmlns:a16="http://schemas.microsoft.com/office/drawing/2014/main" id="{3D21217B-C1F4-D52E-F2B5-B3B53FA14B43}"/>
+                <a16:creationId xmlns:a16="http://schemas.microsoft.com/office/drawing/2014/main" id="{C6F8FD47-8155-88BE-9AA5-57FC8D294652}"/>
               </a:ext>
             </a:extLst>
           </p:cNvPr>
@@ -41747,15 +41583,16 @@
           </p:cNvPicPr>
           <p:nvPr/>
         </p:nvPicPr>
-        <p:blipFill rotWithShape="1">
+        <p:blipFill>
           <a:blip r:embed="rId2"/>
-          <a:srcRect b="90"/>
-          <a:stretch/>
+          <a:stretch>
+            <a:fillRect/>
+          </a:stretch>
         </p:blipFill>
         <p:spPr>
           <a:xfrm>
-            <a:off x="457200" y="457200"/>
-            <a:ext cx="11277600" cy="5943600"/>
+            <a:off x="864951" y="643467"/>
+            <a:ext cx="10462097" cy="5571066"/>
           </a:xfrm>
           <a:prstGeom prst="rect">
             <a:avLst/>
@@ -41951,6 +41788,182 @@
 </file>
 
 <file path=ppt/slides/slide14.xml><?xml version="1.0" encoding="utf-8"?>
+<p:sld xmlns:a="http://schemas.openxmlformats.org/drawingml/2006/main" xmlns:r="http://schemas.openxmlformats.org/officeDocument/2006/relationships" xmlns:p="http://schemas.openxmlformats.org/presentationml/2006/main">
+  <p:cSld>
+    <p:bg>
+      <p:bgPr>
+        <a:solidFill>
+          <a:schemeClr val="bg1"/>
+        </a:solidFill>
+        <a:effectLst/>
+      </p:bgPr>
+    </p:bg>
+    <p:spTree>
+      <p:nvGrpSpPr>
+        <p:cNvPr id="1" name=""/>
+        <p:cNvGrpSpPr/>
+        <p:nvPr/>
+      </p:nvGrpSpPr>
+      <p:grpSpPr>
+        <a:xfrm>
+          <a:off x="0" y="0"/>
+          <a:ext cx="0" cy="0"/>
+          <a:chOff x="0" y="0"/>
+          <a:chExt cx="0" cy="0"/>
+        </a:xfrm>
+      </p:grpSpPr>
+      <p:sp>
+        <p:nvSpPr>
+          <p:cNvPr id="20" name="Rectangle 19">
+            <a:extLst>
+              <a:ext uri="{FF2B5EF4-FFF2-40B4-BE49-F238E27FC236}">
+                <a16:creationId xmlns:a16="http://schemas.microsoft.com/office/drawing/2014/main" id="{A4AC5506-6312-4701-8D3C-40187889A947}"/>
+              </a:ext>
+              <a:ext uri="{C183D7F6-B498-43B3-948B-1728B52AA6E4}">
+                <adec:decorative xmlns:adec="http://schemas.microsoft.com/office/drawing/2017/decorative" val="1"/>
+              </a:ext>
+            </a:extLst>
+          </p:cNvPr>
+          <p:cNvSpPr>
+            <a:spLocks noGrp="1" noRot="1" noChangeAspect="1" noMove="1" noResize="1" noEditPoints="1" noAdjustHandles="1" noChangeArrowheads="1" noChangeShapeType="1" noTextEdit="1"/>
+          </p:cNvSpPr>
+          <p:nvPr>
+            <p:extLst>
+              <p:ext uri="{386F3935-93C4-4BCD-93E2-E3B085C9AB24}">
+                <p16:designElem xmlns:p16="http://schemas.microsoft.com/office/powerpoint/2015/main" val="1"/>
+              </p:ext>
+            </p:extLst>
+          </p:nvPr>
+        </p:nvSpPr>
+        <p:spPr>
+          <a:xfrm>
+            <a:off x="0" y="651752"/>
+            <a:ext cx="12192000" cy="736551"/>
+          </a:xfrm>
+          <a:prstGeom prst="rect">
+            <a:avLst/>
+          </a:prstGeom>
+          <a:solidFill>
+            <a:schemeClr val="tx1"/>
+          </a:solidFill>
+          <a:ln>
+            <a:noFill/>
+          </a:ln>
+        </p:spPr>
+        <p:style>
+          <a:lnRef idx="2">
+            <a:schemeClr val="accent1">
+              <a:shade val="50000"/>
+            </a:schemeClr>
+          </a:lnRef>
+          <a:fillRef idx="1">
+            <a:schemeClr val="accent1"/>
+          </a:fillRef>
+          <a:effectRef idx="0">
+            <a:schemeClr val="accent1"/>
+          </a:effectRef>
+          <a:fontRef idx="minor">
+            <a:schemeClr val="lt1"/>
+          </a:fontRef>
+        </p:style>
+        <p:txBody>
+          <a:bodyPr rtlCol="0" anchor="ctr"/>
+          <a:lstStyle/>
+          <a:p>
+            <a:pPr algn="ctr"/>
+            <a:endParaRPr lang="en-US"/>
+          </a:p>
+        </p:txBody>
+      </p:sp>
+      <p:sp>
+        <p:nvSpPr>
+          <p:cNvPr id="2" name="Title 1">
+            <a:extLst>
+              <a:ext uri="{FF2B5EF4-FFF2-40B4-BE49-F238E27FC236}">
+                <a16:creationId xmlns:a16="http://schemas.microsoft.com/office/drawing/2014/main" id="{42CB144A-69ED-A6C7-A483-F0484CC65E73}"/>
+              </a:ext>
+            </a:extLst>
+          </p:cNvPr>
+          <p:cNvSpPr>
+            <a:spLocks noGrp="1"/>
+          </p:cNvSpPr>
+          <p:nvPr>
+            <p:ph type="title"/>
+          </p:nvPr>
+        </p:nvSpPr>
+        <p:spPr>
+          <a:xfrm>
+            <a:off x="556532" y="643467"/>
+            <a:ext cx="11210925" cy="744836"/>
+          </a:xfrm>
+        </p:spPr>
+        <p:txBody>
+          <a:bodyPr vert="horz" lIns="91440" tIns="45720" rIns="91440" bIns="45720" rtlCol="0" anchor="ctr">
+            <a:normAutofit/>
+          </a:bodyPr>
+          <a:lstStyle/>
+          <a:p>
+            <a:pPr algn="ctr"/>
+            <a:r>
+              <a:rPr lang="en-US" sz="3200" kern="1200">
+                <a:solidFill>
+                  <a:schemeClr val="bg1"/>
+                </a:solidFill>
+                <a:latin typeface="+mj-lt"/>
+                <a:ea typeface="+mj-ea"/>
+                <a:cs typeface="+mj-cs"/>
+              </a:rPr>
+              <a:t>Model Comparison</a:t>
+            </a:r>
+          </a:p>
+        </p:txBody>
+      </p:sp>
+      <p:pic>
+        <p:nvPicPr>
+          <p:cNvPr id="5" name="Content Placeholder 4">
+            <a:extLst>
+              <a:ext uri="{FF2B5EF4-FFF2-40B4-BE49-F238E27FC236}">
+                <a16:creationId xmlns:a16="http://schemas.microsoft.com/office/drawing/2014/main" id="{E8D5A8E0-106C-0837-4D2C-50BBAC04319F}"/>
+              </a:ext>
+            </a:extLst>
+          </p:cNvPr>
+          <p:cNvPicPr>
+            <a:picLocks noGrp="1" noChangeAspect="1"/>
+          </p:cNvPicPr>
+          <p:nvPr>
+            <p:ph idx="1"/>
+          </p:nvPr>
+        </p:nvPicPr>
+        <p:blipFill>
+          <a:blip r:embed="rId2"/>
+          <a:stretch>
+            <a:fillRect/>
+          </a:stretch>
+        </p:blipFill>
+        <p:spPr>
+          <a:xfrm>
+            <a:off x="643467" y="1704945"/>
+            <a:ext cx="10905066" cy="4334762"/>
+          </a:xfrm>
+          <a:prstGeom prst="rect">
+            <a:avLst/>
+          </a:prstGeom>
+        </p:spPr>
+      </p:pic>
+    </p:spTree>
+    <p:extLst>
+      <p:ext uri="{BB962C8B-B14F-4D97-AF65-F5344CB8AC3E}">
+        <p14:creationId xmlns:p14="http://schemas.microsoft.com/office/powerpoint/2010/main" val="1093459252"/>
+      </p:ext>
+    </p:extLst>
+  </p:cSld>
+  <p:clrMapOvr>
+    <a:masterClrMapping/>
+  </p:clrMapOvr>
+</p:sld>
+</file>
+
+<file path=ppt/slides/slide15.xml><?xml version="1.0" encoding="utf-8"?>
 <p:sld xmlns:a="http://schemas.openxmlformats.org/drawingml/2006/main" xmlns:r="http://schemas.openxmlformats.org/officeDocument/2006/relationships" xmlns:p="http://schemas.openxmlformats.org/presentationml/2006/main">
   <p:cSld>
     <p:bg>
@@ -42580,7 +42593,7 @@
             <p:ph idx="1"/>
             <p:extLst>
               <p:ext uri="{D42A27DB-BD31-4B8C-83A1-F6EECF244321}">
-                <p14:modId xmlns:p14="http://schemas.microsoft.com/office/powerpoint/2010/main" val="4081979893"/>
+                <p14:modId xmlns:p14="http://schemas.microsoft.com/office/powerpoint/2010/main" val="2327087750"/>
               </p:ext>
             </p:extLst>
           </p:nvPr>
@@ -42783,13 +42796,13 @@
                     <a:p>
                       <a:pPr algn="r" rtl="0" fontAlgn="b"/>
                       <a:r>
-                        <a:rPr lang="en-GB" sz="2100" cap="none" spc="0">
+                        <a:rPr lang="en-GB" sz="2100" cap="none" spc="0" dirty="0">
                           <a:solidFill>
                             <a:schemeClr val="tx1"/>
                           </a:solidFill>
                           <a:effectLst/>
                         </a:rPr>
-                        <a:t>55.72%</a:t>
+                        <a:t>64.41%</a:t>
                       </a:r>
                     </a:p>
                   </a:txBody>
@@ -42822,13 +42835,13 @@
                     <a:p>
                       <a:pPr rtl="0" fontAlgn="b"/>
                       <a:r>
-                        <a:rPr lang="en-US" sz="2100" cap="none" spc="0">
+                        <a:rPr lang="en-US" sz="2100" cap="none" spc="0" dirty="0">
                           <a:solidFill>
                             <a:schemeClr val="tx1"/>
                           </a:solidFill>
                           <a:effectLst/>
                         </a:rPr>
-                        <a:t>82.11% (training), 75.96% (validation), 75% (test)</a:t>
+                        <a:t>90.59% (training), 73.95% (validation), 73.52% (test)</a:t>
                       </a:r>
                     </a:p>
                   </a:txBody>
@@ -42911,13 +42924,13 @@
                     <a:p>
                       <a:pPr algn="r" rtl="0" fontAlgn="b"/>
                       <a:r>
-                        <a:rPr lang="en-GB" sz="2100" cap="none" spc="0">
+                        <a:rPr lang="en-GB" sz="2100" cap="none" spc="0" dirty="0">
                           <a:solidFill>
                             <a:schemeClr val="tx1"/>
                           </a:solidFill>
                           <a:effectLst/>
                         </a:rPr>
-                        <a:t>1.3712</a:t>
+                        <a:t>1.2282</a:t>
                       </a:r>
                     </a:p>
                   </a:txBody>
@@ -42954,13 +42967,13 @@
                     <a:p>
                       <a:pPr rtl="0" fontAlgn="b"/>
                       <a:r>
-                        <a:rPr lang="en-US" sz="2100" cap="none" spc="0">
+                        <a:rPr lang="en-US" sz="2100" cap="none" spc="0" dirty="0">
                           <a:solidFill>
                             <a:schemeClr val="tx1"/>
                           </a:solidFill>
                           <a:effectLst/>
                         </a:rPr>
-                        <a:t>0.5090 (training), 0.7483 (validation), 0.74 (test)</a:t>
+                        <a:t>1.06 (training), 1.08 (test)</a:t>
                       </a:r>
                     </a:p>
                   </a:txBody>
@@ -43043,13 +43056,22 @@
                     <a:p>
                       <a:pPr rtl="0" fontAlgn="b"/>
                       <a:r>
-                        <a:rPr lang="en-GB" sz="2100" cap="none" spc="0">
+                        <a:rPr lang="en-US" sz="2100" cap="none" spc="0" dirty="0">
                           <a:solidFill>
                             <a:schemeClr val="tx1"/>
                           </a:solidFill>
                           <a:effectLst/>
                         </a:rPr>
-                        <a:t>2.25 hours</a:t>
+                        <a:t>15</a:t>
+                      </a:r>
+                      <a:r>
+                        <a:rPr lang="en-GB" sz="2100" cap="none" spc="0" dirty="0">
+                          <a:solidFill>
+                            <a:schemeClr val="tx1"/>
+                          </a:solidFill>
+                          <a:effectLst/>
+                        </a:rPr>
+                        <a:t>mins 20.4 sec</a:t>
                       </a:r>
                     </a:p>
                   </a:txBody>
@@ -43082,13 +43104,13 @@
                     <a:p>
                       <a:pPr rtl="0" fontAlgn="b"/>
                       <a:r>
-                        <a:rPr lang="en-GB" sz="2100" cap="none" spc="0">
+                        <a:rPr lang="en-GB" sz="2100" cap="none" spc="0" dirty="0">
                           <a:solidFill>
                             <a:schemeClr val="tx1"/>
                           </a:solidFill>
                           <a:effectLst/>
                         </a:rPr>
-                        <a:t>5.5 hours</a:t>
+                        <a:t>8.04 hours</a:t>
                       </a:r>
                     </a:p>
                   </a:txBody>
@@ -43171,7 +43193,7 @@
                     <a:p>
                       <a:pPr algn="r" rtl="0" fontAlgn="b"/>
                       <a:r>
-                        <a:rPr lang="en-GB" sz="2100" cap="none" spc="0">
+                        <a:rPr lang="en-US" sz="2100" cap="none" spc="0" dirty="0">
                           <a:solidFill>
                             <a:schemeClr val="tx1"/>
                           </a:solidFill>
@@ -43179,6 +43201,12 @@
                         </a:rPr>
                         <a:t>10</a:t>
                       </a:r>
+                      <a:endParaRPr lang="en-GB" sz="2100" cap="none" spc="0" dirty="0">
+                        <a:solidFill>
+                          <a:schemeClr val="tx1"/>
+                        </a:solidFill>
+                        <a:effectLst/>
+                      </a:endParaRPr>
                     </a:p>
                   </a:txBody>
                   <a:tcPr marL="80627" marR="80627" marT="77098" marB="161254" anchor="b">
@@ -43214,14 +43242,20 @@
                     <a:p>
                       <a:pPr algn="r" rtl="0" fontAlgn="b"/>
                       <a:r>
-                        <a:rPr lang="en-GB" sz="2100" cap="none" spc="0">
+                        <a:rPr lang="en-US" sz="2100" cap="none" spc="0" dirty="0">
                           <a:solidFill>
                             <a:schemeClr val="tx1"/>
                           </a:solidFill>
                           <a:effectLst/>
                         </a:rPr>
-                        <a:t>9</a:t>
+                        <a:t>10</a:t>
                       </a:r>
+                      <a:endParaRPr lang="en-GB" sz="2100" cap="none" spc="0" dirty="0">
+                        <a:solidFill>
+                          <a:schemeClr val="tx1"/>
+                        </a:solidFill>
+                        <a:effectLst/>
+                      </a:endParaRPr>
                     </a:p>
                   </a:txBody>
                   <a:tcPr marL="80627" marR="80627" marT="77098" marB="161254" anchor="b">
@@ -43273,7 +43307,7 @@
 </p:sld>
 </file>
 
-<file path=ppt/slides/slide15.xml><?xml version="1.0" encoding="utf-8"?>
+<file path=ppt/slides/slide16.xml><?xml version="1.0" encoding="utf-8"?>
 <p:sld xmlns:a="http://schemas.openxmlformats.org/drawingml/2006/main" xmlns:r="http://schemas.openxmlformats.org/officeDocument/2006/relationships" xmlns:p="http://schemas.openxmlformats.org/presentationml/2006/main">
   <p:cSld>
     <p:spTree>
@@ -43356,7 +43390,7 @@
 </p:sld>
 </file>
 
-<file path=ppt/slides/slide16.xml><?xml version="1.0" encoding="utf-8"?>
+<file path=ppt/slides/slide17.xml><?xml version="1.0" encoding="utf-8"?>
 <p:sld xmlns:a="http://schemas.openxmlformats.org/drawingml/2006/main" xmlns:r="http://schemas.openxmlformats.org/officeDocument/2006/relationships" xmlns:p="http://schemas.openxmlformats.org/presentationml/2006/main">
   <p:cSld>
     <p:bg>

</xml_diff>